<commit_message>
fix(fixing e2e test errors and implementing exception cases in e2e client)
</commit_message>
<xml_diff>
--- a/docs/Ecommerce.pptx
+++ b/docs/Ecommerce.pptx
@@ -35,6 +35,8 @@
     <p:sldId id="284" r:id="rId29"/>
     <p:sldId id="285" r:id="rId30"/>
     <p:sldId id="286" r:id="rId31"/>
+    <p:sldId id="287" r:id="rId32"/>
+    <p:sldId id="288" r:id="rId33"/>
   </p:sldIdLst>
   <p:sldSz cx="12192000" cy="6858000"/>
   <p:notesSz cx="6858000" cy="9144000"/>
@@ -272,7 +274,7 @@
           <a:p>
             <a:fld id="{6A9C06A2-5176-47A7-BD77-A8BC4A21F27E}" type="datetimeFigureOut">
               <a:rPr lang="pt-BR" smtClean="0"/>
-              <a:t>10/09/2025</a:t>
+              <a:t>24/09/2025</a:t>
             </a:fld>
             <a:endParaRPr lang="pt-BR"/>
           </a:p>
@@ -442,7 +444,7 @@
           <a:p>
             <a:fld id="{6A9C06A2-5176-47A7-BD77-A8BC4A21F27E}" type="datetimeFigureOut">
               <a:rPr lang="pt-BR" smtClean="0"/>
-              <a:t>10/09/2025</a:t>
+              <a:t>24/09/2025</a:t>
             </a:fld>
             <a:endParaRPr lang="pt-BR"/>
           </a:p>
@@ -622,7 +624,7 @@
           <a:p>
             <a:fld id="{6A9C06A2-5176-47A7-BD77-A8BC4A21F27E}" type="datetimeFigureOut">
               <a:rPr lang="pt-BR" smtClean="0"/>
-              <a:t>10/09/2025</a:t>
+              <a:t>24/09/2025</a:t>
             </a:fld>
             <a:endParaRPr lang="pt-BR"/>
           </a:p>
@@ -792,7 +794,7 @@
           <a:p>
             <a:fld id="{6A9C06A2-5176-47A7-BD77-A8BC4A21F27E}" type="datetimeFigureOut">
               <a:rPr lang="pt-BR" smtClean="0"/>
-              <a:t>10/09/2025</a:t>
+              <a:t>24/09/2025</a:t>
             </a:fld>
             <a:endParaRPr lang="pt-BR"/>
           </a:p>
@@ -1038,7 +1040,7 @@
           <a:p>
             <a:fld id="{6A9C06A2-5176-47A7-BD77-A8BC4A21F27E}" type="datetimeFigureOut">
               <a:rPr lang="pt-BR" smtClean="0"/>
-              <a:t>10/09/2025</a:t>
+              <a:t>24/09/2025</a:t>
             </a:fld>
             <a:endParaRPr lang="pt-BR"/>
           </a:p>
@@ -1270,7 +1272,7 @@
           <a:p>
             <a:fld id="{6A9C06A2-5176-47A7-BD77-A8BC4A21F27E}" type="datetimeFigureOut">
               <a:rPr lang="pt-BR" smtClean="0"/>
-              <a:t>10/09/2025</a:t>
+              <a:t>24/09/2025</a:t>
             </a:fld>
             <a:endParaRPr lang="pt-BR"/>
           </a:p>
@@ -1637,7 +1639,7 @@
           <a:p>
             <a:fld id="{6A9C06A2-5176-47A7-BD77-A8BC4A21F27E}" type="datetimeFigureOut">
               <a:rPr lang="pt-BR" smtClean="0"/>
-              <a:t>10/09/2025</a:t>
+              <a:t>24/09/2025</a:t>
             </a:fld>
             <a:endParaRPr lang="pt-BR"/>
           </a:p>
@@ -1755,7 +1757,7 @@
           <a:p>
             <a:fld id="{6A9C06A2-5176-47A7-BD77-A8BC4A21F27E}" type="datetimeFigureOut">
               <a:rPr lang="pt-BR" smtClean="0"/>
-              <a:t>10/09/2025</a:t>
+              <a:t>24/09/2025</a:t>
             </a:fld>
             <a:endParaRPr lang="pt-BR"/>
           </a:p>
@@ -1850,7 +1852,7 @@
           <a:p>
             <a:fld id="{6A9C06A2-5176-47A7-BD77-A8BC4A21F27E}" type="datetimeFigureOut">
               <a:rPr lang="pt-BR" smtClean="0"/>
-              <a:t>10/09/2025</a:t>
+              <a:t>24/09/2025</a:t>
             </a:fld>
             <a:endParaRPr lang="pt-BR"/>
           </a:p>
@@ -2127,7 +2129,7 @@
           <a:p>
             <a:fld id="{6A9C06A2-5176-47A7-BD77-A8BC4A21F27E}" type="datetimeFigureOut">
               <a:rPr lang="pt-BR" smtClean="0"/>
-              <a:t>10/09/2025</a:t>
+              <a:t>24/09/2025</a:t>
             </a:fld>
             <a:endParaRPr lang="pt-BR"/>
           </a:p>
@@ -2380,7 +2382,7 @@
           <a:p>
             <a:fld id="{6A9C06A2-5176-47A7-BD77-A8BC4A21F27E}" type="datetimeFigureOut">
               <a:rPr lang="pt-BR" smtClean="0"/>
-              <a:t>10/09/2025</a:t>
+              <a:t>24/09/2025</a:t>
             </a:fld>
             <a:endParaRPr lang="pt-BR"/>
           </a:p>
@@ -2593,7 +2595,7 @@
           <a:p>
             <a:fld id="{6A9C06A2-5176-47A7-BD77-A8BC4A21F27E}" type="datetimeFigureOut">
               <a:rPr lang="pt-BR" smtClean="0"/>
-              <a:t>10/09/2025</a:t>
+              <a:t>24/09/2025</a:t>
             </a:fld>
             <a:endParaRPr lang="pt-BR"/>
           </a:p>
@@ -5007,8 +5009,8 @@
         </p:blipFill>
         <p:spPr>
           <a:xfrm>
-            <a:off x="838200" y="2240599"/>
-            <a:ext cx="10515600" cy="3521390"/>
+            <a:off x="838200" y="1316182"/>
+            <a:ext cx="10515600" cy="5015345"/>
           </a:xfrm>
         </p:spPr>
       </p:pic>
@@ -5296,35 +5298,250 @@
               <a:rPr lang="pt-BR" sz="2800" b="1" dirty="0" smtClean="0">
                 <a:latin typeface="Arial Black" panose="020B0A04020102020204" pitchFamily="34" charset="0"/>
               </a:rPr>
-              <a:t>Teste automatizados, crud cliente</a:t>
+              <a:t>Teste automatizados de </a:t>
+            </a:r>
+            <a:r>
+              <a:rPr lang="pt-BR" sz="2800" b="1" dirty="0" err="1" smtClean="0">
+                <a:latin typeface="Arial Black" panose="020B0A04020102020204" pitchFamily="34" charset="0"/>
+              </a:rPr>
+              <a:t>crud</a:t>
+            </a:r>
+            <a:r>
+              <a:rPr lang="pt-BR" sz="2800" b="1" dirty="0" smtClean="0">
+                <a:latin typeface="Arial Black" panose="020B0A04020102020204" pitchFamily="34" charset="0"/>
+              </a:rPr>
+              <a:t> cliente</a:t>
+            </a:r>
+            <a:br>
+              <a:rPr lang="pt-BR" sz="2800" b="1" dirty="0" smtClean="0">
+                <a:latin typeface="Arial Black" panose="020B0A04020102020204" pitchFamily="34" charset="0"/>
+              </a:rPr>
+            </a:br>
+            <a:r>
+              <a:rPr lang="pt-BR" sz="2800" b="1" dirty="0" err="1" smtClean="0">
+                <a:latin typeface="Arial Black" panose="020B0A04020102020204" pitchFamily="34" charset="0"/>
+              </a:rPr>
+              <a:t>Playwright</a:t>
             </a:r>
             <a:endParaRPr lang="pt-BR" sz="2800" dirty="0"/>
           </a:p>
         </p:txBody>
       </p:sp>
-      <p:sp>
-        <p:nvSpPr>
-          <p:cNvPr id="3" name="Espaço Reservado para Conteúdo 2"/>
-          <p:cNvSpPr>
-            <a:spLocks noGrp="1"/>
-          </p:cNvSpPr>
+      <p:pic>
+        <p:nvPicPr>
+          <p:cNvPr id="4" name="Espaço Reservado para Conteúdo 3"/>
+          <p:cNvPicPr>
+            <a:picLocks noGrp="1" noChangeAspect="1"/>
+          </p:cNvPicPr>
           <p:nvPr>
             <p:ph idx="1"/>
           </p:nvPr>
-        </p:nvSpPr>
-        <p:spPr/>
-        <p:txBody>
-          <a:bodyPr/>
-          <a:lstStyle/>
-          <a:p>
-            <a:endParaRPr lang="pt-BR" dirty="0"/>
-          </a:p>
-        </p:txBody>
-      </p:sp>
+        </p:nvPicPr>
+        <p:blipFill>
+          <a:blip r:embed="rId2">
+            <a:extLst>
+              <a:ext uri="{28A0092B-C50C-407E-A947-70E740481C1C}">
+                <a14:useLocalDpi xmlns:a14="http://schemas.microsoft.com/office/drawing/2010/main" val="0"/>
+              </a:ext>
+            </a:extLst>
+          </a:blip>
+          <a:stretch>
+            <a:fillRect/>
+          </a:stretch>
+        </p:blipFill>
+        <p:spPr>
+          <a:xfrm>
+            <a:off x="838200" y="1923027"/>
+            <a:ext cx="10515600" cy="4156533"/>
+          </a:xfrm>
+        </p:spPr>
+      </p:pic>
     </p:spTree>
     <p:extLst>
       <p:ext uri="{BB962C8B-B14F-4D97-AF65-F5344CB8AC3E}">
         <p14:creationId xmlns:p14="http://schemas.microsoft.com/office/powerpoint/2010/main" val="471366276"/>
+      </p:ext>
+    </p:extLst>
+  </p:cSld>
+  <p:clrMapOvr>
+    <a:masterClrMapping/>
+  </p:clrMapOvr>
+</p:sld>
+</file>
+
+<file path=ppt/slides/slide31.xml><?xml version="1.0" encoding="utf-8"?>
+<p:sld xmlns:a="http://schemas.openxmlformats.org/drawingml/2006/main" xmlns:r="http://schemas.openxmlformats.org/officeDocument/2006/relationships" xmlns:p="http://schemas.openxmlformats.org/presentationml/2006/main">
+  <p:cSld>
+    <p:spTree>
+      <p:nvGrpSpPr>
+        <p:cNvPr id="1" name=""/>
+        <p:cNvGrpSpPr/>
+        <p:nvPr/>
+      </p:nvGrpSpPr>
+      <p:grpSpPr>
+        <a:xfrm>
+          <a:off x="0" y="0"/>
+          <a:ext cx="0" cy="0"/>
+          <a:chOff x="0" y="0"/>
+          <a:chExt cx="0" cy="0"/>
+        </a:xfrm>
+      </p:grpSpPr>
+      <p:sp>
+        <p:nvSpPr>
+          <p:cNvPr id="2" name="Título 1"/>
+          <p:cNvSpPr>
+            <a:spLocks noGrp="1"/>
+          </p:cNvSpPr>
+          <p:nvPr>
+            <p:ph type="title"/>
+          </p:nvPr>
+        </p:nvSpPr>
+        <p:spPr/>
+        <p:txBody>
+          <a:bodyPr>
+            <a:normAutofit/>
+          </a:bodyPr>
+          <a:lstStyle/>
+          <a:p>
+            <a:pPr algn="ctr"/>
+            <a:r>
+              <a:rPr lang="pt-BR" sz="2800" dirty="0" smtClean="0">
+                <a:latin typeface="Arial Black" panose="020B0A04020102020204" pitchFamily="34" charset="0"/>
+              </a:rPr>
+              <a:t>E2E Cliente</a:t>
+            </a:r>
+            <a:endParaRPr lang="pt-BR" sz="2800" dirty="0">
+              <a:latin typeface="Arial Black" panose="020B0A04020102020204" pitchFamily="34" charset="0"/>
+            </a:endParaRPr>
+          </a:p>
+        </p:txBody>
+      </p:sp>
+      <p:pic>
+        <p:nvPicPr>
+          <p:cNvPr id="5" name="Espaço Reservado para Conteúdo 4"/>
+          <p:cNvPicPr>
+            <a:picLocks noGrp="1" noChangeAspect="1"/>
+          </p:cNvPicPr>
+          <p:nvPr>
+            <p:ph idx="1"/>
+          </p:nvPr>
+        </p:nvPicPr>
+        <p:blipFill>
+          <a:blip r:embed="rId2">
+            <a:extLst>
+              <a:ext uri="{28A0092B-C50C-407E-A947-70E740481C1C}">
+                <a14:useLocalDpi xmlns:a14="http://schemas.microsoft.com/office/drawing/2010/main" val="0"/>
+              </a:ext>
+            </a:extLst>
+          </a:blip>
+          <a:stretch>
+            <a:fillRect/>
+          </a:stretch>
+        </p:blipFill>
+        <p:spPr>
+          <a:xfrm>
+            <a:off x="3671455" y="1825625"/>
+            <a:ext cx="4696690" cy="4351338"/>
+          </a:xfrm>
+        </p:spPr>
+      </p:pic>
+    </p:spTree>
+    <p:extLst>
+      <p:ext uri="{BB962C8B-B14F-4D97-AF65-F5344CB8AC3E}">
+        <p14:creationId xmlns:p14="http://schemas.microsoft.com/office/powerpoint/2010/main" val="612218632"/>
+      </p:ext>
+    </p:extLst>
+  </p:cSld>
+  <p:clrMapOvr>
+    <a:masterClrMapping/>
+  </p:clrMapOvr>
+</p:sld>
+</file>
+
+<file path=ppt/slides/slide32.xml><?xml version="1.0" encoding="utf-8"?>
+<p:sld xmlns:a="http://schemas.openxmlformats.org/drawingml/2006/main" xmlns:r="http://schemas.openxmlformats.org/officeDocument/2006/relationships" xmlns:p="http://schemas.openxmlformats.org/presentationml/2006/main">
+  <p:cSld>
+    <p:spTree>
+      <p:nvGrpSpPr>
+        <p:cNvPr id="1" name=""/>
+        <p:cNvGrpSpPr/>
+        <p:nvPr/>
+      </p:nvGrpSpPr>
+      <p:grpSpPr>
+        <a:xfrm>
+          <a:off x="0" y="0"/>
+          <a:ext cx="0" cy="0"/>
+          <a:chOff x="0" y="0"/>
+          <a:chExt cx="0" cy="0"/>
+        </a:xfrm>
+      </p:grpSpPr>
+      <p:sp>
+        <p:nvSpPr>
+          <p:cNvPr id="2" name="Título 1"/>
+          <p:cNvSpPr>
+            <a:spLocks noGrp="1"/>
+          </p:cNvSpPr>
+          <p:nvPr>
+            <p:ph type="title"/>
+          </p:nvPr>
+        </p:nvSpPr>
+        <p:spPr/>
+        <p:txBody>
+          <a:bodyPr>
+            <a:normAutofit/>
+          </a:bodyPr>
+          <a:lstStyle/>
+          <a:p>
+            <a:pPr algn="ctr"/>
+            <a:r>
+              <a:rPr lang="pt-BR" sz="2800" dirty="0">
+                <a:latin typeface="Arial Black" panose="020B0A04020102020204" pitchFamily="34" charset="0"/>
+              </a:rPr>
+              <a:t>E2E </a:t>
+            </a:r>
+            <a:r>
+              <a:rPr lang="pt-BR" sz="2800" dirty="0" smtClean="0">
+                <a:latin typeface="Arial Black" panose="020B0A04020102020204" pitchFamily="34" charset="0"/>
+              </a:rPr>
+              <a:t>Cliente : Cobertura</a:t>
+            </a:r>
+            <a:endParaRPr lang="pt-BR" sz="2800" dirty="0"/>
+          </a:p>
+        </p:txBody>
+      </p:sp>
+      <p:pic>
+        <p:nvPicPr>
+          <p:cNvPr id="4" name="Espaço Reservado para Conteúdo 3"/>
+          <p:cNvPicPr>
+            <a:picLocks noGrp="1" noChangeAspect="1"/>
+          </p:cNvPicPr>
+          <p:nvPr>
+            <p:ph idx="1"/>
+          </p:nvPr>
+        </p:nvPicPr>
+        <p:blipFill>
+          <a:blip r:embed="rId2">
+            <a:extLst>
+              <a:ext uri="{28A0092B-C50C-407E-A947-70E740481C1C}">
+                <a14:useLocalDpi xmlns:a14="http://schemas.microsoft.com/office/drawing/2010/main" val="0"/>
+              </a:ext>
+            </a:extLst>
+          </a:blip>
+          <a:stretch>
+            <a:fillRect/>
+          </a:stretch>
+        </p:blipFill>
+        <p:spPr>
+          <a:xfrm>
+            <a:off x="1080656" y="1482436"/>
+            <a:ext cx="9578140" cy="4694527"/>
+          </a:xfrm>
+        </p:spPr>
+      </p:pic>
+    </p:spTree>
+    <p:extLst>
+      <p:ext uri="{BB962C8B-B14F-4D97-AF65-F5344CB8AC3E}">
+        <p14:creationId xmlns:p14="http://schemas.microsoft.com/office/powerpoint/2010/main" val="1170232302"/>
       </p:ext>
     </p:extLst>
   </p:cSld>

</xml_diff>